<commit_message>
Terminada presentación (En un principio).
</commit_message>
<xml_diff>
--- a/Presentación/Presentacion TFG.pptx
+++ b/Presentación/Presentacion TFG.pptx
@@ -5,7 +5,7 @@
     <p:sldMasterId id="2147483660" r:id="rId1"/>
   </p:sldMasterIdLst>
   <p:notesMasterIdLst>
-    <p:notesMasterId r:id="rId30"/>
+    <p:notesMasterId r:id="rId31"/>
   </p:notesMasterIdLst>
   <p:sldIdLst>
     <p:sldId id="256" r:id="rId2"/>
@@ -31,11 +31,12 @@
     <p:sldId id="290" r:id="rId22"/>
     <p:sldId id="281" r:id="rId23"/>
     <p:sldId id="274" r:id="rId24"/>
-    <p:sldId id="282" r:id="rId25"/>
-    <p:sldId id="275" r:id="rId26"/>
-    <p:sldId id="287" r:id="rId27"/>
-    <p:sldId id="264" r:id="rId28"/>
-    <p:sldId id="265" r:id="rId29"/>
+    <p:sldId id="291" r:id="rId25"/>
+    <p:sldId id="282" r:id="rId26"/>
+    <p:sldId id="275" r:id="rId27"/>
+    <p:sldId id="287" r:id="rId28"/>
+    <p:sldId id="264" r:id="rId29"/>
+    <p:sldId id="265" r:id="rId30"/>
   </p:sldIdLst>
   <p:sldSz cx="12192000" cy="6858000"/>
   <p:notesSz cx="6858000" cy="9144000"/>
@@ -182,6 +183,7 @@
           <p14:sldIdLst>
             <p14:sldId id="281"/>
             <p14:sldId id="274"/>
+            <p14:sldId id="291"/>
           </p14:sldIdLst>
         </p14:section>
         <p14:section name="Vídeo" id="{7CA64AED-32DD-4074-942A-93E8446C7ECC}">
@@ -8869,7 +8871,7 @@
           <a:p>
             <a:fld id="{85F0EFCF-B614-4068-B216-F7563730AD52}" type="datetimeFigureOut">
               <a:rPr lang="es-ES" smtClean="0"/>
-              <a:t>12/10/2020</a:t>
+              <a:t>13/10/2020</a:t>
             </a:fld>
             <a:endParaRPr lang="es-ES"/>
           </a:p>
@@ -9651,6 +9653,202 @@
 </p:notes>
 </file>
 
+<file path=ppt/notesSlides/notesSlide15.xml><?xml version="1.0" encoding="utf-8"?>
+<p:notes xmlns:a="http://schemas.openxmlformats.org/drawingml/2006/main" xmlns:r="http://schemas.openxmlformats.org/officeDocument/2006/relationships" xmlns:p="http://schemas.openxmlformats.org/presentationml/2006/main">
+  <p:cSld>
+    <p:spTree>
+      <p:nvGrpSpPr>
+        <p:cNvPr id="1" name=""/>
+        <p:cNvGrpSpPr/>
+        <p:nvPr/>
+      </p:nvGrpSpPr>
+      <p:grpSpPr>
+        <a:xfrm>
+          <a:off x="0" y="0"/>
+          <a:ext cx="0" cy="0"/>
+          <a:chOff x="0" y="0"/>
+          <a:chExt cx="0" cy="0"/>
+        </a:xfrm>
+      </p:grpSpPr>
+      <p:sp>
+        <p:nvSpPr>
+          <p:cNvPr id="2" name="Marcador de imagen de diapositiva 1"/>
+          <p:cNvSpPr>
+            <a:spLocks noGrp="1" noRot="1" noChangeAspect="1"/>
+          </p:cNvSpPr>
+          <p:nvPr>
+            <p:ph type="sldImg"/>
+          </p:nvPr>
+        </p:nvSpPr>
+        <p:spPr/>
+      </p:sp>
+      <p:sp>
+        <p:nvSpPr>
+          <p:cNvPr id="3" name="Marcador de notas 2"/>
+          <p:cNvSpPr>
+            <a:spLocks noGrp="1"/>
+          </p:cNvSpPr>
+          <p:nvPr>
+            <p:ph type="body" idx="1"/>
+          </p:nvPr>
+        </p:nvSpPr>
+        <p:spPr/>
+        <p:txBody>
+          <a:bodyPr/>
+          <a:lstStyle/>
+          <a:p>
+            <a:endParaRPr lang="es-ES" dirty="0"/>
+          </a:p>
+        </p:txBody>
+      </p:sp>
+      <p:sp>
+        <p:nvSpPr>
+          <p:cNvPr id="4" name="Marcador de número de diapositiva 3"/>
+          <p:cNvSpPr>
+            <a:spLocks noGrp="1"/>
+          </p:cNvSpPr>
+          <p:nvPr>
+            <p:ph type="sldNum" sz="quarter" idx="5"/>
+          </p:nvPr>
+        </p:nvSpPr>
+        <p:spPr/>
+        <p:txBody>
+          <a:bodyPr/>
+          <a:lstStyle/>
+          <a:p>
+            <a:fld id="{363962C0-CA5D-4093-8E58-B0A79430F5E4}" type="slidenum">
+              <a:rPr lang="es-ES" smtClean="0"/>
+              <a:t>24</a:t>
+            </a:fld>
+            <a:endParaRPr lang="es-ES"/>
+          </a:p>
+        </p:txBody>
+      </p:sp>
+    </p:spTree>
+    <p:extLst>
+      <p:ext uri="{BB962C8B-B14F-4D97-AF65-F5344CB8AC3E}">
+        <p14:creationId xmlns:p14="http://schemas.microsoft.com/office/powerpoint/2010/main" val="3028427543"/>
+      </p:ext>
+    </p:extLst>
+  </p:cSld>
+  <p:clrMapOvr>
+    <a:masterClrMapping/>
+  </p:clrMapOvr>
+</p:notes>
+</file>
+
+<file path=ppt/notesSlides/notesSlide16.xml><?xml version="1.0" encoding="utf-8"?>
+<p:notes xmlns:a="http://schemas.openxmlformats.org/drawingml/2006/main" xmlns:r="http://schemas.openxmlformats.org/officeDocument/2006/relationships" xmlns:p="http://schemas.openxmlformats.org/presentationml/2006/main">
+  <p:cSld>
+    <p:spTree>
+      <p:nvGrpSpPr>
+        <p:cNvPr id="1" name=""/>
+        <p:cNvGrpSpPr/>
+        <p:nvPr/>
+      </p:nvGrpSpPr>
+      <p:grpSpPr>
+        <a:xfrm>
+          <a:off x="0" y="0"/>
+          <a:ext cx="0" cy="0"/>
+          <a:chOff x="0" y="0"/>
+          <a:chExt cx="0" cy="0"/>
+        </a:xfrm>
+      </p:grpSpPr>
+      <p:sp>
+        <p:nvSpPr>
+          <p:cNvPr id="2" name="Marcador de imagen de diapositiva 1"/>
+          <p:cNvSpPr>
+            <a:spLocks noGrp="1" noRot="1" noChangeAspect="1"/>
+          </p:cNvSpPr>
+          <p:nvPr>
+            <p:ph type="sldImg"/>
+          </p:nvPr>
+        </p:nvSpPr>
+        <p:spPr/>
+      </p:sp>
+      <p:sp>
+        <p:nvSpPr>
+          <p:cNvPr id="3" name="Marcador de notas 2"/>
+          <p:cNvSpPr>
+            <a:spLocks noGrp="1"/>
+          </p:cNvSpPr>
+          <p:nvPr>
+            <p:ph type="body" idx="1"/>
+          </p:nvPr>
+        </p:nvSpPr>
+        <p:spPr/>
+        <p:txBody>
+          <a:bodyPr/>
+          <a:lstStyle/>
+          <a:p>
+            <a:pPr lvl="0"/>
+            <a:r>
+              <a:rPr lang="es-ES" sz="2000" dirty="0"/>
+              <a:t>Objetivos específicos:</a:t>
+            </a:r>
+          </a:p>
+          <a:p>
+            <a:pPr lvl="1"/>
+            <a:r>
+              <a:rPr lang="es-ES" sz="2000" dirty="0"/>
+              <a:t>Manipulación del vehículo con teclado y ratón.</a:t>
+            </a:r>
+          </a:p>
+          <a:p>
+            <a:pPr lvl="1"/>
+            <a:r>
+              <a:rPr lang="es-ES" sz="2000" dirty="0"/>
+              <a:t>Visualización con distintos tipos de proyección y con una cámara giratoria.</a:t>
+            </a:r>
+          </a:p>
+          <a:p>
+            <a:pPr lvl="1"/>
+            <a:r>
+              <a:rPr lang="es-ES" sz="2000" dirty="0"/>
+              <a:t>Poder añadir un circuito y recoger datos sobre las vueltas.</a:t>
+            </a:r>
+          </a:p>
+          <a:p>
+            <a:endParaRPr lang="es-ES" dirty="0"/>
+          </a:p>
+        </p:txBody>
+      </p:sp>
+      <p:sp>
+        <p:nvSpPr>
+          <p:cNvPr id="4" name="Marcador de número de diapositiva 3"/>
+          <p:cNvSpPr>
+            <a:spLocks noGrp="1"/>
+          </p:cNvSpPr>
+          <p:nvPr>
+            <p:ph type="sldNum" sz="quarter" idx="5"/>
+          </p:nvPr>
+        </p:nvSpPr>
+        <p:spPr/>
+        <p:txBody>
+          <a:bodyPr/>
+          <a:lstStyle/>
+          <a:p>
+            <a:fld id="{363962C0-CA5D-4093-8E58-B0A79430F5E4}" type="slidenum">
+              <a:rPr lang="es-ES" smtClean="0"/>
+              <a:t>28</a:t>
+            </a:fld>
+            <a:endParaRPr lang="es-ES"/>
+          </a:p>
+        </p:txBody>
+      </p:sp>
+    </p:spTree>
+    <p:extLst>
+      <p:ext uri="{BB962C8B-B14F-4D97-AF65-F5344CB8AC3E}">
+        <p14:creationId xmlns:p14="http://schemas.microsoft.com/office/powerpoint/2010/main" val="3064493464"/>
+      </p:ext>
+    </p:extLst>
+  </p:cSld>
+  <p:clrMapOvr>
+    <a:masterClrMapping/>
+  </p:clrMapOvr>
+</p:notes>
+</file>
+
 <file path=ppt/notesSlides/notesSlide2.xml><?xml version="1.0" encoding="utf-8"?>
 <p:notes xmlns:a="http://schemas.openxmlformats.org/drawingml/2006/main" xmlns:r="http://schemas.openxmlformats.org/officeDocument/2006/relationships" xmlns:p="http://schemas.openxmlformats.org/presentationml/2006/main">
   <p:cSld>
@@ -10544,7 +10742,7 @@
           <a:effectLst/>
           <a:extLst>
             <a:ext uri="{91240B29-F687-4f45-9708-019B960494DF}">
-              <a14:hiddenLine xmlns="" xmlns:a14="http://schemas.microsoft.com/office/drawing/2010/main" w="9525">
+              <a14:hiddenLine xmlns:a14="http://schemas.microsoft.com/office/drawing/2010/main" xmlns="" w="9525">
                 <a:solidFill>
                   <a:srgbClr val="000000"/>
                 </a:solidFill>
@@ -10736,7 +10934,7 @@
           <a:p>
             <a:fld id="{E28C9A9C-EDD8-4198-B192-13B318A0B9EE}" type="datetime1">
               <a:rPr lang="es-ES" smtClean="0"/>
-              <a:t>12/10/2020</a:t>
+              <a:t>13/10/2020</a:t>
             </a:fld>
             <a:endParaRPr lang="es-ES"/>
           </a:p>
@@ -11054,7 +11252,7 @@
           <a:p>
             <a:fld id="{5E94F8D1-073B-460D-9820-205B283E274C}" type="datetime1">
               <a:rPr lang="es-ES" smtClean="0"/>
-              <a:t>12/10/2020</a:t>
+              <a:t>13/10/2020</a:t>
             </a:fld>
             <a:endParaRPr lang="es-ES"/>
           </a:p>
@@ -11542,7 +11740,7 @@
           <a:p>
             <a:fld id="{A231AD32-90CF-4FEF-88F3-F155C88B574B}" type="datetime1">
               <a:rPr lang="es-ES" smtClean="0"/>
-              <a:t>12/10/2020</a:t>
+              <a:t>13/10/2020</a:t>
             </a:fld>
             <a:endParaRPr lang="es-ES"/>
           </a:p>
@@ -11911,7 +12109,7 @@
           <a:p>
             <a:fld id="{FEBA89A1-B4D8-4B74-A7BA-E90223D72943}" type="datetime1">
               <a:rPr lang="es-ES" smtClean="0"/>
-              <a:t>12/10/2020</a:t>
+              <a:t>13/10/2020</a:t>
             </a:fld>
             <a:endParaRPr lang="es-ES"/>
           </a:p>
@@ -12066,7 +12264,7 @@
           <a:ln/>
           <a:extLst>
             <a:ext uri="{91240B29-F687-4f45-9708-019B960494DF}">
-              <a14:hiddenLine xmlns="" xmlns:a14="http://schemas.microsoft.com/office/drawing/2010/main" w="9525">
+              <a14:hiddenLine xmlns:a14="http://schemas.microsoft.com/office/drawing/2010/main" xmlns="" w="9525">
                 <a:solidFill>
                   <a:srgbClr val="000000"/>
                 </a:solidFill>
@@ -12184,7 +12382,7 @@
           <a:p>
             <a:fld id="{13E6C600-E185-4E3A-A61A-809A5DB34737}" type="datetime1">
               <a:rPr lang="es-ES" smtClean="0"/>
-              <a:t>12/10/2020</a:t>
+              <a:t>13/10/2020</a:t>
             </a:fld>
             <a:endParaRPr lang="es-ES"/>
           </a:p>
@@ -12341,7 +12539,7 @@
           <a:ln/>
           <a:extLst>
             <a:ext uri="{91240B29-F687-4f45-9708-019B960494DF}">
-              <a14:hiddenLine xmlns="" xmlns:a14="http://schemas.microsoft.com/office/drawing/2010/main" w="9525">
+              <a14:hiddenLine xmlns:a14="http://schemas.microsoft.com/office/drawing/2010/main" xmlns="" w="9525">
                 <a:solidFill>
                   <a:srgbClr val="000000"/>
                 </a:solidFill>
@@ -12469,7 +12667,7 @@
           <a:p>
             <a:fld id="{BE274FD0-3B9E-402E-B02F-374DC9FBC0C4}" type="datetime1">
               <a:rPr lang="es-ES" smtClean="0"/>
-              <a:t>12/10/2020</a:t>
+              <a:t>13/10/2020</a:t>
             </a:fld>
             <a:endParaRPr lang="es-ES"/>
           </a:p>
@@ -12624,7 +12822,7 @@
           <a:ln/>
           <a:extLst>
             <a:ext uri="{91240B29-F687-4f45-9708-019B960494DF}">
-              <a14:hiddenLine xmlns="" xmlns:a14="http://schemas.microsoft.com/office/drawing/2010/main" w="9525">
+              <a14:hiddenLine xmlns:a14="http://schemas.microsoft.com/office/drawing/2010/main" xmlns="" w="9525">
                 <a:solidFill>
                   <a:srgbClr val="000000"/>
                 </a:solidFill>
@@ -12752,7 +12950,7 @@
           <a:p>
             <a:fld id="{E4B8BFAC-48AB-438D-B652-4924110593D1}" type="datetime1">
               <a:rPr lang="es-ES" smtClean="0"/>
-              <a:t>12/10/2020</a:t>
+              <a:t>13/10/2020</a:t>
             </a:fld>
             <a:endParaRPr lang="es-ES"/>
           </a:p>
@@ -13095,7 +13293,7 @@
           <a:p>
             <a:fld id="{F95C182E-DD2D-4FC8-88A8-3FFEDE76A2CA}" type="datetime1">
               <a:rPr lang="es-ES" smtClean="0"/>
-              <a:t>12/10/2020</a:t>
+              <a:t>13/10/2020</a:t>
             </a:fld>
             <a:endParaRPr lang="es-ES"/>
           </a:p>
@@ -13250,7 +13448,7 @@
           <a:ln/>
           <a:extLst>
             <a:ext uri="{91240B29-F687-4f45-9708-019B960494DF}">
-              <a14:hiddenLine xmlns="" xmlns:a14="http://schemas.microsoft.com/office/drawing/2010/main" w="9525">
+              <a14:hiddenLine xmlns:a14="http://schemas.microsoft.com/office/drawing/2010/main" xmlns="" w="9525">
                 <a:solidFill>
                   <a:srgbClr val="000000"/>
                 </a:solidFill>
@@ -13434,7 +13632,7 @@
           <a:p>
             <a:fld id="{D1488A95-6433-4542-82F5-3A0C3D545517}" type="datetime1">
               <a:rPr lang="es-ES" smtClean="0"/>
-              <a:t>12/10/2020</a:t>
+              <a:t>13/10/2020</a:t>
             </a:fld>
             <a:endParaRPr lang="es-ES"/>
           </a:p>
@@ -13589,7 +13787,7 @@
           <a:ln/>
           <a:extLst>
             <a:ext uri="{91240B29-F687-4f45-9708-019B960494DF}">
-              <a14:hiddenLine xmlns="" xmlns:a14="http://schemas.microsoft.com/office/drawing/2010/main" w="9525">
+              <a14:hiddenLine xmlns:a14="http://schemas.microsoft.com/office/drawing/2010/main" xmlns="" w="9525">
                 <a:solidFill>
                   <a:srgbClr val="000000"/>
                 </a:solidFill>
@@ -13911,7 +14109,7 @@
           <a:p>
             <a:fld id="{AB722415-5F60-4690-B3C3-AC8D94158B68}" type="datetime1">
               <a:rPr lang="es-ES" smtClean="0"/>
-              <a:t>12/10/2020</a:t>
+              <a:t>13/10/2020</a:t>
             </a:fld>
             <a:endParaRPr lang="es-ES"/>
           </a:p>
@@ -14066,7 +14264,7 @@
           <a:ln/>
           <a:extLst>
             <a:ext uri="{91240B29-F687-4f45-9708-019B960494DF}">
-              <a14:hiddenLine xmlns="" xmlns:a14="http://schemas.microsoft.com/office/drawing/2010/main" w="9525">
+              <a14:hiddenLine xmlns:a14="http://schemas.microsoft.com/office/drawing/2010/main" xmlns="" w="9525">
                 <a:solidFill>
                   <a:srgbClr val="000000"/>
                 </a:solidFill>
@@ -14132,7 +14330,7 @@
           <a:p>
             <a:fld id="{800CEFA6-ADC7-454C-B702-FB7806348B0E}" type="datetime1">
               <a:rPr lang="es-ES" smtClean="0"/>
-              <a:t>12/10/2020</a:t>
+              <a:t>13/10/2020</a:t>
             </a:fld>
             <a:endParaRPr lang="es-ES"/>
           </a:p>
@@ -14227,7 +14425,7 @@
           <a:p>
             <a:fld id="{28830155-37B9-484E-8BC2-8F7C83577E11}" type="datetime1">
               <a:rPr lang="es-ES" smtClean="0"/>
-              <a:t>12/10/2020</a:t>
+              <a:t>13/10/2020</a:t>
             </a:fld>
             <a:endParaRPr lang="es-ES"/>
           </a:p>
@@ -14495,7 +14693,7 @@
           <a:ln/>
           <a:extLst>
             <a:ext uri="{91240B29-F687-4f45-9708-019B960494DF}">
-              <a14:hiddenLine xmlns="" xmlns:a14="http://schemas.microsoft.com/office/drawing/2010/main" w="9525">
+              <a14:hiddenLine xmlns:a14="http://schemas.microsoft.com/office/drawing/2010/main" xmlns="" w="9525">
                 <a:solidFill>
                   <a:srgbClr val="000000"/>
                 </a:solidFill>
@@ -14694,7 +14892,7 @@
           <a:p>
             <a:fld id="{08ACD45F-798B-4BFC-95F6-033FB5F5CD0C}" type="datetime1">
               <a:rPr lang="es-ES" smtClean="0"/>
-              <a:t>12/10/2020</a:t>
+              <a:t>13/10/2020</a:t>
             </a:fld>
             <a:endParaRPr lang="es-ES"/>
           </a:p>
@@ -15007,7 +15205,7 @@
           <a:p>
             <a:fld id="{0C11F35B-53A6-4A04-843E-7763E1F6FEE8}" type="datetime1">
               <a:rPr lang="es-ES" smtClean="0"/>
-              <a:t>12/10/2020</a:t>
+              <a:t>13/10/2020</a:t>
             </a:fld>
             <a:endParaRPr lang="es-ES"/>
           </a:p>
@@ -15277,7 +15475,7 @@
           <a:p>
             <a:fld id="{920BE8E0-F37A-4E3F-AFD2-C92712EC0098}" type="datetime1">
               <a:rPr lang="es-ES" smtClean="0"/>
-              <a:t>12/10/2020</a:t>
+              <a:t>13/10/2020</a:t>
             </a:fld>
             <a:endParaRPr lang="es-ES"/>
           </a:p>
@@ -19033,12 +19231,96 @@
             <p:ph idx="1"/>
           </p:nvPr>
         </p:nvSpPr>
-        <p:spPr/>
+        <p:spPr>
+          <a:xfrm>
+            <a:off x="827424" y="2395297"/>
+            <a:ext cx="10554574" cy="3520591"/>
+          </a:xfrm>
+        </p:spPr>
         <p:txBody>
-          <a:bodyPr/>
+          <a:bodyPr numCol="2">
+            <a:normAutofit/>
+          </a:bodyPr>
           <a:lstStyle/>
           <a:p>
-            <a:endParaRPr lang="es-ES"/>
+            <a:r>
+              <a:rPr lang="es-ES" sz="2800" dirty="0"/>
+              <a:t>7 pruebas:</a:t>
+            </a:r>
+          </a:p>
+          <a:p>
+            <a:pPr lvl="1">
+              <a:buFont typeface="+mj-lt"/>
+              <a:buAutoNum type="arabicPeriod"/>
+            </a:pPr>
+            <a:r>
+              <a:rPr lang="es-ES" sz="2400" dirty="0"/>
+              <a:t>Estándar.</a:t>
+            </a:r>
+          </a:p>
+          <a:p>
+            <a:pPr lvl="1">
+              <a:buFont typeface="+mj-lt"/>
+              <a:buAutoNum type="arabicPeriod"/>
+            </a:pPr>
+            <a:r>
+              <a:rPr lang="es-ES" sz="2400" dirty="0"/>
+              <a:t>Reducción distancia entre ruedas.</a:t>
+            </a:r>
+          </a:p>
+          <a:p>
+            <a:pPr lvl="1">
+              <a:buFont typeface="+mj-lt"/>
+              <a:buAutoNum type="arabicPeriod"/>
+            </a:pPr>
+            <a:r>
+              <a:rPr lang="es-ES" sz="2400" dirty="0"/>
+              <a:t>Reducción distancia entre sensores.</a:t>
+            </a:r>
+          </a:p>
+          <a:p>
+            <a:pPr lvl="1">
+              <a:buFont typeface="+mj-lt"/>
+              <a:buAutoNum type="arabicPeriod"/>
+            </a:pPr>
+            <a:endParaRPr lang="es-ES" sz="2400" dirty="0"/>
+          </a:p>
+          <a:p>
+            <a:pPr lvl="1">
+              <a:buFont typeface="+mj-lt"/>
+              <a:buAutoNum type="arabicPeriod"/>
+            </a:pPr>
+            <a:endParaRPr lang="es-ES" sz="2400" dirty="0"/>
+          </a:p>
+          <a:p>
+            <a:pPr lvl="1">
+              <a:buFont typeface="+mj-lt"/>
+              <a:buAutoNum type="arabicPeriod"/>
+            </a:pPr>
+            <a:r>
+              <a:rPr lang="es-ES" sz="2400" dirty="0"/>
+              <a:t>Aumento distancia ruedas sensores.</a:t>
+            </a:r>
+          </a:p>
+          <a:p>
+            <a:pPr lvl="1">
+              <a:buFont typeface="+mj-lt"/>
+              <a:buAutoNum type="arabicPeriod"/>
+            </a:pPr>
+            <a:r>
+              <a:rPr lang="es-ES" sz="2400" dirty="0"/>
+              <a:t>Aumento de velocidad angular.</a:t>
+            </a:r>
+          </a:p>
+          <a:p>
+            <a:pPr lvl="1">
+              <a:buFont typeface="+mj-lt"/>
+              <a:buAutoNum type="arabicPeriod"/>
+            </a:pPr>
+            <a:r>
+              <a:rPr lang="es-ES" sz="2400" dirty="0"/>
+              <a:t>Aumento radio de las ruedas.</a:t>
+            </a:r>
           </a:p>
         </p:txBody>
       </p:sp>
@@ -19087,6 +19369,14 @@
 <file path=ppt/slides/slide24.xml><?xml version="1.0" encoding="utf-8"?>
 <p:sld xmlns:a="http://schemas.openxmlformats.org/drawingml/2006/main" xmlns:r="http://schemas.openxmlformats.org/officeDocument/2006/relationships" xmlns:p="http://schemas.openxmlformats.org/presentationml/2006/main">
   <p:cSld>
+    <p:bg>
+      <p:bgPr>
+        <a:solidFill>
+          <a:schemeClr val="bg2"/>
+        </a:solidFill>
+        <a:effectLst/>
+      </p:bgPr>
+    </p:bg>
     <p:spTree>
       <p:nvGrpSpPr>
         <p:cNvPr id="1" name=""/>
@@ -19106,7 +19396,7 @@
           <p:cNvPr id="2" name="Título 1">
             <a:extLst>
               <a:ext uri="{FF2B5EF4-FFF2-40B4-BE49-F238E27FC236}">
-                <a16:creationId xmlns:a16="http://schemas.microsoft.com/office/drawing/2014/main" id="{99629A13-BBCD-4675-B0AF-1422BC481D47}"/>
+                <a16:creationId xmlns:a16="http://schemas.microsoft.com/office/drawing/2014/main" id="{41CCF0A6-9D20-4BF9-B413-B977DC741AF6}"/>
               </a:ext>
             </a:extLst>
           </p:cNvPr>
@@ -19117,24 +19407,31 @@
             <p:ph type="title"/>
           </p:nvPr>
         </p:nvSpPr>
-        <p:spPr/>
+        <p:spPr>
+          <a:xfrm>
+            <a:off x="810000" y="447188"/>
+            <a:ext cx="10571998" cy="970450"/>
+          </a:xfrm>
+        </p:spPr>
         <p:txBody>
-          <a:bodyPr/>
+          <a:bodyPr>
+            <a:normAutofit/>
+          </a:bodyPr>
           <a:lstStyle/>
           <a:p>
             <a:r>
               <a:rPr lang="es-ES" dirty="0"/>
-              <a:t>Índice</a:t>
+              <a:t>Pruebas: Séptima prueba.</a:t>
             </a:r>
           </a:p>
         </p:txBody>
       </p:sp>
       <p:sp>
         <p:nvSpPr>
-          <p:cNvPr id="3" name="Marcador de contenido 2">
+          <p:cNvPr id="6" name="Marcador de contenido 5">
             <a:extLst>
               <a:ext uri="{FF2B5EF4-FFF2-40B4-BE49-F238E27FC236}">
-                <a16:creationId xmlns:a16="http://schemas.microsoft.com/office/drawing/2014/main" id="{19FDC435-2252-4AAA-B09D-7D31BF9DAC5B}"/>
+                <a16:creationId xmlns:a16="http://schemas.microsoft.com/office/drawing/2014/main" id="{2734F2EC-93DA-437E-9DEC-D04CA2FE935E}"/>
               </a:ext>
             </a:extLst>
           </p:cNvPr>
@@ -19147,65 +19444,20 @@
         </p:nvSpPr>
         <p:spPr>
           <a:xfrm>
-            <a:off x="810000" y="2921620"/>
-            <a:ext cx="10554574" cy="3936380"/>
+            <a:off x="818713" y="2312639"/>
+            <a:ext cx="8792979" cy="709341"/>
           </a:xfrm>
         </p:spPr>
         <p:txBody>
           <a:bodyPr>
-            <a:normAutofit fontScale="85000" lnSpcReduction="20000"/>
+            <a:normAutofit/>
           </a:bodyPr>
           <a:lstStyle/>
           <a:p>
             <a:r>
-              <a:rPr lang="es-ES" sz="3600" dirty="0"/>
-              <a:t>Introducción</a:t>
-            </a:r>
-          </a:p>
-          <a:p>
-            <a:r>
-              <a:rPr lang="es-ES" sz="3600" dirty="0"/>
-              <a:t>Modelado del sistema</a:t>
-            </a:r>
-          </a:p>
-          <a:p>
-            <a:r>
-              <a:rPr lang="es-ES" sz="3600" dirty="0"/>
-              <a:t>Entorno tecnológico</a:t>
-            </a:r>
-          </a:p>
-          <a:p>
-            <a:r>
-              <a:rPr lang="es-ES" sz="3600" dirty="0"/>
-              <a:t>Descripción de la aplicación</a:t>
-            </a:r>
-          </a:p>
-          <a:p>
-            <a:r>
-              <a:rPr lang="es-ES" sz="3600" dirty="0"/>
-              <a:t>Pruebas</a:t>
-            </a:r>
-          </a:p>
-          <a:p>
-            <a:r>
-              <a:rPr lang="es-ES" sz="3600" b="1" dirty="0"/>
-              <a:t>Video</a:t>
-            </a:r>
-          </a:p>
-          <a:p>
-            <a:r>
-              <a:rPr lang="es-ES" sz="3600" dirty="0"/>
-              <a:t>Conclusiones</a:t>
-            </a:r>
-          </a:p>
-          <a:p>
-            <a:endParaRPr lang="es-ES" dirty="0"/>
-          </a:p>
-          <a:p>
-            <a:endParaRPr lang="es-ES" dirty="0"/>
-          </a:p>
-          <a:p>
-            <a:endParaRPr lang="es-ES" dirty="0"/>
+              <a:rPr lang="es-ES" sz="1600" dirty="0"/>
+              <a:t>Buscamos el mejor resultado sin aumentar velocidad.</a:t>
+            </a:r>
           </a:p>
         </p:txBody>
       </p:sp>
@@ -19214,7 +19466,7 @@
           <p:cNvPr id="4" name="Marcador de número de diapositiva 3">
             <a:extLst>
               <a:ext uri="{FF2B5EF4-FFF2-40B4-BE49-F238E27FC236}">
-                <a16:creationId xmlns:a16="http://schemas.microsoft.com/office/drawing/2014/main" id="{4CB7E394-5AF0-4E29-912E-88635E0ECD2A}"/>
+                <a16:creationId xmlns:a16="http://schemas.microsoft.com/office/drawing/2014/main" id="{6AEFF735-6130-496F-B57C-85F185D6BD07}"/>
               </a:ext>
             </a:extLst>
           </p:cNvPr>
@@ -19225,23 +19477,84 @@
             <p:ph type="sldNum" sz="quarter" idx="12"/>
           </p:nvPr>
         </p:nvSpPr>
-        <p:spPr/>
+        <p:spPr>
+          <a:xfrm>
+            <a:off x="10317045" y="6129338"/>
+            <a:ext cx="1062155" cy="490599"/>
+          </a:xfrm>
+        </p:spPr>
         <p:txBody>
-          <a:bodyPr/>
+          <a:bodyPr>
+            <a:normAutofit/>
+          </a:bodyPr>
           <a:lstStyle/>
           <a:p>
+            <a:pPr>
+              <a:spcAft>
+                <a:spcPts val="600"/>
+              </a:spcAft>
+            </a:pPr>
             <a:fld id="{5452FDC3-B045-4A3B-9520-6737031B2C45}" type="slidenum">
               <a:rPr lang="es-ES" smtClean="0"/>
+              <a:pPr>
+                <a:spcAft>
+                  <a:spcPts val="600"/>
+                </a:spcAft>
+              </a:pPr>
               <a:t>24</a:t>
             </a:fld>
-            <a:endParaRPr lang="es-ES" dirty="0"/>
+            <a:endParaRPr lang="es-ES"/>
           </a:p>
         </p:txBody>
       </p:sp>
+      <p:pic>
+        <p:nvPicPr>
+          <p:cNvPr id="8" name="Imagen 7" descr="Tabla&#10;&#10;Descripción generada automáticamente">
+            <a:extLst>
+              <a:ext uri="{FF2B5EF4-FFF2-40B4-BE49-F238E27FC236}">
+                <a16:creationId xmlns:a16="http://schemas.microsoft.com/office/drawing/2014/main" id="{A402A0C5-C803-40C9-810B-644807A9FC07}"/>
+              </a:ext>
+            </a:extLst>
+          </p:cNvPr>
+          <p:cNvPicPr>
+            <a:picLocks noChangeAspect="1"/>
+          </p:cNvPicPr>
+          <p:nvPr/>
+        </p:nvPicPr>
+        <p:blipFill>
+          <a:blip r:embed="rId3">
+            <a:extLst>
+              <a:ext uri="{28A0092B-C50C-407E-A947-70E740481C1C}">
+                <a14:useLocalDpi xmlns:a14="http://schemas.microsoft.com/office/drawing/2010/main" val="0"/>
+              </a:ext>
+            </a:extLst>
+          </a:blip>
+          <a:stretch>
+            <a:fillRect/>
+          </a:stretch>
+        </p:blipFill>
+        <p:spPr>
+          <a:xfrm>
+            <a:off x="2577776" y="3122341"/>
+            <a:ext cx="7033916" cy="3006997"/>
+          </a:xfrm>
+          <a:prstGeom prst="roundRect">
+            <a:avLst>
+              <a:gd name="adj" fmla="val 3876"/>
+            </a:avLst>
+          </a:prstGeom>
+          <a:ln>
+            <a:solidFill>
+              <a:schemeClr val="accent1"/>
+            </a:solidFill>
+          </a:ln>
+          <a:effectLst/>
+        </p:spPr>
+      </p:pic>
     </p:spTree>
     <p:extLst>
       <p:ext uri="{BB962C8B-B14F-4D97-AF65-F5344CB8AC3E}">
-        <p14:creationId xmlns:p14="http://schemas.microsoft.com/office/powerpoint/2010/main" val="1207708785"/>
+        <p14:creationId xmlns:p14="http://schemas.microsoft.com/office/powerpoint/2010/main" val="848395969"/>
       </p:ext>
     </p:extLst>
   </p:cSld>
@@ -19273,7 +19586,7 @@
           <p:cNvPr id="2" name="Título 1">
             <a:extLst>
               <a:ext uri="{FF2B5EF4-FFF2-40B4-BE49-F238E27FC236}">
-                <a16:creationId xmlns:a16="http://schemas.microsoft.com/office/drawing/2014/main" id="{5D1F1BAB-3A2D-4896-BBB2-BE3352857610}"/>
+                <a16:creationId xmlns:a16="http://schemas.microsoft.com/office/drawing/2014/main" id="{99629A13-BBCD-4675-B0AF-1422BC481D47}"/>
               </a:ext>
             </a:extLst>
           </p:cNvPr>
@@ -19291,7 +19604,7 @@
           <a:p>
             <a:r>
               <a:rPr lang="es-ES" dirty="0"/>
-              <a:t>Video</a:t>
+              <a:t>Índice</a:t>
             </a:r>
           </a:p>
         </p:txBody>
@@ -19301,7 +19614,7 @@
           <p:cNvPr id="3" name="Marcador de contenido 2">
             <a:extLst>
               <a:ext uri="{FF2B5EF4-FFF2-40B4-BE49-F238E27FC236}">
-                <a16:creationId xmlns:a16="http://schemas.microsoft.com/office/drawing/2014/main" id="{6923C868-5F19-4D46-B9A2-887B107F7953}"/>
+                <a16:creationId xmlns:a16="http://schemas.microsoft.com/office/drawing/2014/main" id="{19FDC435-2252-4AAA-B09D-7D31BF9DAC5B}"/>
               </a:ext>
             </a:extLst>
           </p:cNvPr>
@@ -19312,10 +19625,65 @@
             <p:ph idx="1"/>
           </p:nvPr>
         </p:nvSpPr>
-        <p:spPr/>
+        <p:spPr>
+          <a:xfrm>
+            <a:off x="810000" y="2921620"/>
+            <a:ext cx="10554574" cy="3936380"/>
+          </a:xfrm>
+        </p:spPr>
         <p:txBody>
-          <a:bodyPr/>
+          <a:bodyPr>
+            <a:normAutofit fontScale="85000" lnSpcReduction="20000"/>
+          </a:bodyPr>
           <a:lstStyle/>
+          <a:p>
+            <a:r>
+              <a:rPr lang="es-ES" sz="3600" dirty="0"/>
+              <a:t>Introducción</a:t>
+            </a:r>
+          </a:p>
+          <a:p>
+            <a:r>
+              <a:rPr lang="es-ES" sz="3600" dirty="0"/>
+              <a:t>Modelado del sistema</a:t>
+            </a:r>
+          </a:p>
+          <a:p>
+            <a:r>
+              <a:rPr lang="es-ES" sz="3600" dirty="0"/>
+              <a:t>Entorno tecnológico</a:t>
+            </a:r>
+          </a:p>
+          <a:p>
+            <a:r>
+              <a:rPr lang="es-ES" sz="3600" dirty="0"/>
+              <a:t>Descripción de la aplicación</a:t>
+            </a:r>
+          </a:p>
+          <a:p>
+            <a:r>
+              <a:rPr lang="es-ES" sz="3600" dirty="0"/>
+              <a:t>Pruebas</a:t>
+            </a:r>
+          </a:p>
+          <a:p>
+            <a:r>
+              <a:rPr lang="es-ES" sz="3600" b="1" dirty="0"/>
+              <a:t>Video</a:t>
+            </a:r>
+          </a:p>
+          <a:p>
+            <a:r>
+              <a:rPr lang="es-ES" sz="3600" dirty="0"/>
+              <a:t>Conclusiones</a:t>
+            </a:r>
+          </a:p>
+          <a:p>
+            <a:endParaRPr lang="es-ES" dirty="0"/>
+          </a:p>
+          <a:p>
+            <a:endParaRPr lang="es-ES" dirty="0"/>
+          </a:p>
           <a:p>
             <a:endParaRPr lang="es-ES" dirty="0"/>
           </a:p>
@@ -19326,7 +19694,7 @@
           <p:cNvPr id="4" name="Marcador de número de diapositiva 3">
             <a:extLst>
               <a:ext uri="{FF2B5EF4-FFF2-40B4-BE49-F238E27FC236}">
-                <a16:creationId xmlns:a16="http://schemas.microsoft.com/office/drawing/2014/main" id="{BA2507A4-065D-423F-A40D-9986A066F15B}"/>
+                <a16:creationId xmlns:a16="http://schemas.microsoft.com/office/drawing/2014/main" id="{4CB7E394-5AF0-4E29-912E-88635E0ECD2A}"/>
               </a:ext>
             </a:extLst>
           </p:cNvPr>
@@ -19346,14 +19714,14 @@
               <a:rPr lang="es-ES" smtClean="0"/>
               <a:t>25</a:t>
             </a:fld>
-            <a:endParaRPr lang="es-ES"/>
+            <a:endParaRPr lang="es-ES" dirty="0"/>
           </a:p>
         </p:txBody>
       </p:sp>
     </p:spTree>
     <p:extLst>
       <p:ext uri="{BB962C8B-B14F-4D97-AF65-F5344CB8AC3E}">
-        <p14:creationId xmlns:p14="http://schemas.microsoft.com/office/powerpoint/2010/main" val="3875991642"/>
+        <p14:creationId xmlns:p14="http://schemas.microsoft.com/office/powerpoint/2010/main" val="1207708785"/>
       </p:ext>
     </p:extLst>
   </p:cSld>
@@ -19385,7 +19753,7 @@
           <p:cNvPr id="2" name="Título 1">
             <a:extLst>
               <a:ext uri="{FF2B5EF4-FFF2-40B4-BE49-F238E27FC236}">
-                <a16:creationId xmlns:a16="http://schemas.microsoft.com/office/drawing/2014/main" id="{99629A13-BBCD-4675-B0AF-1422BC481D47}"/>
+                <a16:creationId xmlns:a16="http://schemas.microsoft.com/office/drawing/2014/main" id="{5D1F1BAB-3A2D-4896-BBB2-BE3352857610}"/>
               </a:ext>
             </a:extLst>
           </p:cNvPr>
@@ -19403,7 +19771,7 @@
           <a:p>
             <a:r>
               <a:rPr lang="es-ES" dirty="0"/>
-              <a:t>Índice</a:t>
+              <a:t>Video</a:t>
             </a:r>
           </a:p>
         </p:txBody>
@@ -19413,7 +19781,7 @@
           <p:cNvPr id="3" name="Marcador de contenido 2">
             <a:extLst>
               <a:ext uri="{FF2B5EF4-FFF2-40B4-BE49-F238E27FC236}">
-                <a16:creationId xmlns:a16="http://schemas.microsoft.com/office/drawing/2014/main" id="{19FDC435-2252-4AAA-B09D-7D31BF9DAC5B}"/>
+                <a16:creationId xmlns:a16="http://schemas.microsoft.com/office/drawing/2014/main" id="{6923C868-5F19-4D46-B9A2-887B107F7953}"/>
               </a:ext>
             </a:extLst>
           </p:cNvPr>
@@ -19424,65 +19792,10 @@
             <p:ph idx="1"/>
           </p:nvPr>
         </p:nvSpPr>
-        <p:spPr>
-          <a:xfrm>
-            <a:off x="810000" y="2921620"/>
-            <a:ext cx="10554574" cy="3936380"/>
-          </a:xfrm>
-        </p:spPr>
+        <p:spPr/>
         <p:txBody>
-          <a:bodyPr>
-            <a:normAutofit fontScale="85000" lnSpcReduction="20000"/>
-          </a:bodyPr>
+          <a:bodyPr/>
           <a:lstStyle/>
-          <a:p>
-            <a:r>
-              <a:rPr lang="es-ES" sz="3600" dirty="0"/>
-              <a:t>Introducción</a:t>
-            </a:r>
-          </a:p>
-          <a:p>
-            <a:r>
-              <a:rPr lang="es-ES" sz="3600" dirty="0"/>
-              <a:t>Modelado del sistema</a:t>
-            </a:r>
-          </a:p>
-          <a:p>
-            <a:r>
-              <a:rPr lang="es-ES" sz="3600" dirty="0"/>
-              <a:t>Entorno tecnológico</a:t>
-            </a:r>
-          </a:p>
-          <a:p>
-            <a:r>
-              <a:rPr lang="es-ES" sz="3600" dirty="0"/>
-              <a:t>Descripción de la aplicación</a:t>
-            </a:r>
-          </a:p>
-          <a:p>
-            <a:r>
-              <a:rPr lang="es-ES" sz="3600" dirty="0"/>
-              <a:t>Pruebas</a:t>
-            </a:r>
-          </a:p>
-          <a:p>
-            <a:r>
-              <a:rPr lang="es-ES" sz="3600" dirty="0"/>
-              <a:t>Video</a:t>
-            </a:r>
-          </a:p>
-          <a:p>
-            <a:r>
-              <a:rPr lang="es-ES" sz="3600" b="1" dirty="0"/>
-              <a:t>Conclusiones</a:t>
-            </a:r>
-          </a:p>
-          <a:p>
-            <a:endParaRPr lang="es-ES" dirty="0"/>
-          </a:p>
-          <a:p>
-            <a:endParaRPr lang="es-ES" dirty="0"/>
-          </a:p>
           <a:p>
             <a:endParaRPr lang="es-ES" dirty="0"/>
           </a:p>
@@ -19493,7 +19806,7 @@
           <p:cNvPr id="4" name="Marcador de número de diapositiva 3">
             <a:extLst>
               <a:ext uri="{FF2B5EF4-FFF2-40B4-BE49-F238E27FC236}">
-                <a16:creationId xmlns:a16="http://schemas.microsoft.com/office/drawing/2014/main" id="{4CB7E394-5AF0-4E29-912E-88635E0ECD2A}"/>
+                <a16:creationId xmlns:a16="http://schemas.microsoft.com/office/drawing/2014/main" id="{BA2507A4-065D-423F-A40D-9986A066F15B}"/>
               </a:ext>
             </a:extLst>
           </p:cNvPr>
@@ -19513,14 +19826,14 @@
               <a:rPr lang="es-ES" smtClean="0"/>
               <a:t>26</a:t>
             </a:fld>
-            <a:endParaRPr lang="es-ES" dirty="0"/>
+            <a:endParaRPr lang="es-ES"/>
           </a:p>
         </p:txBody>
       </p:sp>
     </p:spTree>
     <p:extLst>
       <p:ext uri="{BB962C8B-B14F-4D97-AF65-F5344CB8AC3E}">
-        <p14:creationId xmlns:p14="http://schemas.microsoft.com/office/powerpoint/2010/main" val="3764456662"/>
+        <p14:creationId xmlns:p14="http://schemas.microsoft.com/office/powerpoint/2010/main" val="3875991642"/>
       </p:ext>
     </p:extLst>
   </p:cSld>
@@ -19552,7 +19865,7 @@
           <p:cNvPr id="2" name="Título 1">
             <a:extLst>
               <a:ext uri="{FF2B5EF4-FFF2-40B4-BE49-F238E27FC236}">
-                <a16:creationId xmlns:a16="http://schemas.microsoft.com/office/drawing/2014/main" id="{BCAAC17A-9891-4919-982E-93CF89D25419}"/>
+                <a16:creationId xmlns:a16="http://schemas.microsoft.com/office/drawing/2014/main" id="{99629A13-BBCD-4675-B0AF-1422BC481D47}"/>
               </a:ext>
             </a:extLst>
           </p:cNvPr>
@@ -19570,7 +19883,7 @@
           <a:p>
             <a:r>
               <a:rPr lang="es-ES" dirty="0"/>
-              <a:t>Conclusiones</a:t>
+              <a:t>Índice</a:t>
             </a:r>
           </a:p>
         </p:txBody>
@@ -19580,7 +19893,7 @@
           <p:cNvPr id="3" name="Marcador de contenido 2">
             <a:extLst>
               <a:ext uri="{FF2B5EF4-FFF2-40B4-BE49-F238E27FC236}">
-                <a16:creationId xmlns:a16="http://schemas.microsoft.com/office/drawing/2014/main" id="{C117F27F-1936-4BF0-8D8C-E60D5BF86370}"/>
+                <a16:creationId xmlns:a16="http://schemas.microsoft.com/office/drawing/2014/main" id="{19FDC435-2252-4AAA-B09D-7D31BF9DAC5B}"/>
               </a:ext>
             </a:extLst>
           </p:cNvPr>
@@ -19591,12 +19904,67 @@
             <p:ph idx="1"/>
           </p:nvPr>
         </p:nvSpPr>
-        <p:spPr/>
+        <p:spPr>
+          <a:xfrm>
+            <a:off x="810000" y="2921620"/>
+            <a:ext cx="10554574" cy="3936380"/>
+          </a:xfrm>
+        </p:spPr>
         <p:txBody>
-          <a:bodyPr/>
+          <a:bodyPr>
+            <a:normAutofit fontScale="85000" lnSpcReduction="20000"/>
+          </a:bodyPr>
           <a:lstStyle/>
           <a:p>
-            <a:endParaRPr lang="es-ES"/>
+            <a:r>
+              <a:rPr lang="es-ES" sz="3600" dirty="0"/>
+              <a:t>Introducción</a:t>
+            </a:r>
+          </a:p>
+          <a:p>
+            <a:r>
+              <a:rPr lang="es-ES" sz="3600" dirty="0"/>
+              <a:t>Modelado del sistema</a:t>
+            </a:r>
+          </a:p>
+          <a:p>
+            <a:r>
+              <a:rPr lang="es-ES" sz="3600" dirty="0"/>
+              <a:t>Entorno tecnológico</a:t>
+            </a:r>
+          </a:p>
+          <a:p>
+            <a:r>
+              <a:rPr lang="es-ES" sz="3600" dirty="0"/>
+              <a:t>Descripción de la aplicación</a:t>
+            </a:r>
+          </a:p>
+          <a:p>
+            <a:r>
+              <a:rPr lang="es-ES" sz="3600" dirty="0"/>
+              <a:t>Pruebas</a:t>
+            </a:r>
+          </a:p>
+          <a:p>
+            <a:r>
+              <a:rPr lang="es-ES" sz="3600" dirty="0"/>
+              <a:t>Video</a:t>
+            </a:r>
+          </a:p>
+          <a:p>
+            <a:r>
+              <a:rPr lang="es-ES" sz="3600" b="1" dirty="0"/>
+              <a:t>Conclusiones</a:t>
+            </a:r>
+          </a:p>
+          <a:p>
+            <a:endParaRPr lang="es-ES" dirty="0"/>
+          </a:p>
+          <a:p>
+            <a:endParaRPr lang="es-ES" dirty="0"/>
+          </a:p>
+          <a:p>
+            <a:endParaRPr lang="es-ES" dirty="0"/>
           </a:p>
         </p:txBody>
       </p:sp>
@@ -19605,7 +19973,7 @@
           <p:cNvPr id="4" name="Marcador de número de diapositiva 3">
             <a:extLst>
               <a:ext uri="{FF2B5EF4-FFF2-40B4-BE49-F238E27FC236}">
-                <a16:creationId xmlns:a16="http://schemas.microsoft.com/office/drawing/2014/main" id="{5389D4E5-8FF9-4BEF-A2FC-05C08C5D5D44}"/>
+                <a16:creationId xmlns:a16="http://schemas.microsoft.com/office/drawing/2014/main" id="{4CB7E394-5AF0-4E29-912E-88635E0ECD2A}"/>
               </a:ext>
             </a:extLst>
           </p:cNvPr>
@@ -19625,14 +19993,14 @@
               <a:rPr lang="es-ES" smtClean="0"/>
               <a:t>27</a:t>
             </a:fld>
-            <a:endParaRPr lang="es-ES"/>
+            <a:endParaRPr lang="es-ES" dirty="0"/>
           </a:p>
         </p:txBody>
       </p:sp>
     </p:spTree>
     <p:extLst>
       <p:ext uri="{BB962C8B-B14F-4D97-AF65-F5344CB8AC3E}">
-        <p14:creationId xmlns:p14="http://schemas.microsoft.com/office/powerpoint/2010/main" val="2020336755"/>
+        <p14:creationId xmlns:p14="http://schemas.microsoft.com/office/powerpoint/2010/main" val="3764456662"/>
       </p:ext>
     </p:extLst>
   </p:cSld>
@@ -19664,6 +20032,167 @@
           <p:cNvPr id="2" name="Título 1">
             <a:extLst>
               <a:ext uri="{FF2B5EF4-FFF2-40B4-BE49-F238E27FC236}">
+                <a16:creationId xmlns:a16="http://schemas.microsoft.com/office/drawing/2014/main" id="{BCAAC17A-9891-4919-982E-93CF89D25419}"/>
+              </a:ext>
+            </a:extLst>
+          </p:cNvPr>
+          <p:cNvSpPr>
+            <a:spLocks noGrp="1"/>
+          </p:cNvSpPr>
+          <p:nvPr>
+            <p:ph type="title"/>
+          </p:nvPr>
+        </p:nvSpPr>
+        <p:spPr/>
+        <p:txBody>
+          <a:bodyPr/>
+          <a:lstStyle/>
+          <a:p>
+            <a:r>
+              <a:rPr lang="es-ES" dirty="0"/>
+              <a:t>Conclusiones</a:t>
+            </a:r>
+          </a:p>
+        </p:txBody>
+      </p:sp>
+      <p:sp>
+        <p:nvSpPr>
+          <p:cNvPr id="3" name="Marcador de contenido 2">
+            <a:extLst>
+              <a:ext uri="{FF2B5EF4-FFF2-40B4-BE49-F238E27FC236}">
+                <a16:creationId xmlns:a16="http://schemas.microsoft.com/office/drawing/2014/main" id="{C117F27F-1936-4BF0-8D8C-E60D5BF86370}"/>
+              </a:ext>
+            </a:extLst>
+          </p:cNvPr>
+          <p:cNvSpPr>
+            <a:spLocks noGrp="1"/>
+          </p:cNvSpPr>
+          <p:nvPr>
+            <p:ph idx="1"/>
+          </p:nvPr>
+        </p:nvSpPr>
+        <p:spPr>
+          <a:xfrm>
+            <a:off x="810000" y="2474662"/>
+            <a:ext cx="10554574" cy="3636511"/>
+          </a:xfrm>
+        </p:spPr>
+        <p:txBody>
+          <a:bodyPr>
+            <a:normAutofit/>
+          </a:bodyPr>
+          <a:lstStyle/>
+          <a:p>
+            <a:r>
+              <a:rPr lang="es-ES" sz="2000" dirty="0"/>
+              <a:t>Podemos ahorrar mucho tiempo y esfuerzo en obtener resultados para nuestro robot físico.</a:t>
+            </a:r>
+          </a:p>
+          <a:p>
+            <a:r>
+              <a:rPr lang="es-ES" sz="2000" dirty="0"/>
+              <a:t>Conseguida una visualización 3D del vehículo.</a:t>
+            </a:r>
+          </a:p>
+          <a:p>
+            <a:r>
+              <a:rPr lang="es-ES" sz="2000" dirty="0"/>
+              <a:t>Todos los objetivos específicos.</a:t>
+            </a:r>
+          </a:p>
+          <a:p>
+            <a:r>
+              <a:rPr lang="es-ES" sz="2000" dirty="0"/>
+              <a:t>Trabajo futuro:</a:t>
+            </a:r>
+          </a:p>
+          <a:p>
+            <a:pPr lvl="1"/>
+            <a:r>
+              <a:rPr lang="es-ES" sz="1800" dirty="0"/>
+              <a:t>Editor avanzado.</a:t>
+            </a:r>
+          </a:p>
+          <a:p>
+            <a:pPr lvl="1"/>
+            <a:r>
+              <a:rPr lang="es-ES" sz="1800" dirty="0"/>
+              <a:t>Generador de circuitos.</a:t>
+            </a:r>
+          </a:p>
+          <a:p>
+            <a:pPr lvl="1"/>
+            <a:r>
+              <a:rPr lang="es-ES" sz="1800" dirty="0"/>
+              <a:t>Estela en el vehículo</a:t>
+            </a:r>
+          </a:p>
+        </p:txBody>
+      </p:sp>
+      <p:sp>
+        <p:nvSpPr>
+          <p:cNvPr id="4" name="Marcador de número de diapositiva 3">
+            <a:extLst>
+              <a:ext uri="{FF2B5EF4-FFF2-40B4-BE49-F238E27FC236}">
+                <a16:creationId xmlns:a16="http://schemas.microsoft.com/office/drawing/2014/main" id="{5389D4E5-8FF9-4BEF-A2FC-05C08C5D5D44}"/>
+              </a:ext>
+            </a:extLst>
+          </p:cNvPr>
+          <p:cNvSpPr>
+            <a:spLocks noGrp="1"/>
+          </p:cNvSpPr>
+          <p:nvPr>
+            <p:ph type="sldNum" sz="quarter" idx="12"/>
+          </p:nvPr>
+        </p:nvSpPr>
+        <p:spPr/>
+        <p:txBody>
+          <a:bodyPr/>
+          <a:lstStyle/>
+          <a:p>
+            <a:fld id="{5452FDC3-B045-4A3B-9520-6737031B2C45}" type="slidenum">
+              <a:rPr lang="es-ES" smtClean="0"/>
+              <a:t>28</a:t>
+            </a:fld>
+            <a:endParaRPr lang="es-ES"/>
+          </a:p>
+        </p:txBody>
+      </p:sp>
+    </p:spTree>
+    <p:extLst>
+      <p:ext uri="{BB962C8B-B14F-4D97-AF65-F5344CB8AC3E}">
+        <p14:creationId xmlns:p14="http://schemas.microsoft.com/office/powerpoint/2010/main" val="2020336755"/>
+      </p:ext>
+    </p:extLst>
+  </p:cSld>
+  <p:clrMapOvr>
+    <a:masterClrMapping/>
+  </p:clrMapOvr>
+</p:sld>
+</file>
+
+<file path=ppt/slides/slide29.xml><?xml version="1.0" encoding="utf-8"?>
+<p:sld xmlns:a="http://schemas.openxmlformats.org/drawingml/2006/main" xmlns:r="http://schemas.openxmlformats.org/officeDocument/2006/relationships" xmlns:p="http://schemas.openxmlformats.org/presentationml/2006/main">
+  <p:cSld>
+    <p:spTree>
+      <p:nvGrpSpPr>
+        <p:cNvPr id="1" name=""/>
+        <p:cNvGrpSpPr/>
+        <p:nvPr/>
+      </p:nvGrpSpPr>
+      <p:grpSpPr>
+        <a:xfrm>
+          <a:off x="0" y="0"/>
+          <a:ext cx="0" cy="0"/>
+          <a:chOff x="0" y="0"/>
+          <a:chExt cx="0" cy="0"/>
+        </a:xfrm>
+      </p:grpSpPr>
+      <p:sp>
+        <p:nvSpPr>
+          <p:cNvPr id="2" name="Título 1">
+            <a:extLst>
+              <a:ext uri="{FF2B5EF4-FFF2-40B4-BE49-F238E27FC236}">
                 <a16:creationId xmlns:a16="http://schemas.microsoft.com/office/drawing/2014/main" id="{B0156483-6551-46CC-A2B0-A2EFEF81DC7C}"/>
               </a:ext>
             </a:extLst>
@@ -19683,37 +20212,6 @@
             <a:r>
               <a:rPr lang="es-ES" dirty="0"/>
               <a:t>Preguntas</a:t>
-            </a:r>
-          </a:p>
-        </p:txBody>
-      </p:sp>
-      <p:sp>
-        <p:nvSpPr>
-          <p:cNvPr id="3" name="Marcador de contenido 2">
-            <a:extLst>
-              <a:ext uri="{FF2B5EF4-FFF2-40B4-BE49-F238E27FC236}">
-                <a16:creationId xmlns:a16="http://schemas.microsoft.com/office/drawing/2014/main" id="{D2EFB9EE-F2F6-4693-8C16-66D748AD228D}"/>
-              </a:ext>
-            </a:extLst>
-          </p:cNvPr>
-          <p:cNvSpPr>
-            <a:spLocks noGrp="1"/>
-          </p:cNvSpPr>
-          <p:nvPr>
-            <p:ph idx="1"/>
-          </p:nvPr>
-        </p:nvSpPr>
-        <p:spPr/>
-        <p:txBody>
-          <a:bodyPr/>
-          <a:lstStyle/>
-          <a:p>
-            <a:pPr marL="0" indent="0">
-              <a:buNone/>
-            </a:pPr>
-            <a:r>
-              <a:rPr lang="es-ES" dirty="0"/>
-              <a:t>Preguntas y Gracias por atender</a:t>
             </a:r>
           </a:p>
         </p:txBody>
@@ -19741,12 +20239,56 @@
           <a:p>
             <a:fld id="{5452FDC3-B045-4A3B-9520-6737031B2C45}" type="slidenum">
               <a:rPr lang="es-ES" smtClean="0"/>
-              <a:t>28</a:t>
+              <a:t>29</a:t>
             </a:fld>
             <a:endParaRPr lang="es-ES"/>
           </a:p>
         </p:txBody>
       </p:sp>
+      <p:pic>
+        <p:nvPicPr>
+          <p:cNvPr id="6" name="Imagen 5">
+            <a:extLst>
+              <a:ext uri="{FF2B5EF4-FFF2-40B4-BE49-F238E27FC236}">
+                <a16:creationId xmlns:a16="http://schemas.microsoft.com/office/drawing/2014/main" id="{96E4577C-3857-4FB7-A344-FEEA362964E5}"/>
+              </a:ext>
+            </a:extLst>
+          </p:cNvPr>
+          <p:cNvPicPr>
+            <a:picLocks noChangeAspect="1"/>
+          </p:cNvPicPr>
+          <p:nvPr/>
+        </p:nvPicPr>
+        <p:blipFill>
+          <a:blip r:embed="rId2">
+            <a:extLst>
+              <a:ext uri="{28A0092B-C50C-407E-A947-70E740481C1C}">
+                <a14:useLocalDpi xmlns:a14="http://schemas.microsoft.com/office/drawing/2010/main" val="0"/>
+              </a:ext>
+            </a:extLst>
+          </a:blip>
+          <a:stretch>
+            <a:fillRect/>
+          </a:stretch>
+        </p:blipFill>
+        <p:spPr>
+          <a:xfrm>
+            <a:off x="4144537" y="2120237"/>
+            <a:ext cx="3657600" cy="4286250"/>
+          </a:xfrm>
+          <a:prstGeom prst="roundRect">
+            <a:avLst>
+              <a:gd name="adj" fmla="val 3876"/>
+            </a:avLst>
+          </a:prstGeom>
+          <a:ln>
+            <a:solidFill>
+              <a:schemeClr val="accent1"/>
+            </a:solidFill>
+          </a:ln>
+          <a:effectLst/>
+        </p:spPr>
+      </p:pic>
     </p:spTree>
     <p:extLst>
       <p:ext uri="{BB962C8B-B14F-4D97-AF65-F5344CB8AC3E}">

</xml_diff>